<commit_message>
Deploy website - based on 064d17d25095920d8c313f3f01581d401ef752fc
</commit_message>
<xml_diff>
--- a/assets/webpage_Image.pptx
+++ b/assets/webpage_Image.pptx
@@ -12011,10 +12011,10 @@
         </p:nvGrpSpPr>
         <p:grpSpPr>
           <a:xfrm>
-            <a:off x="9428735" y="8370306"/>
-            <a:ext cx="8532983" cy="3641152"/>
-            <a:chOff x="9428735" y="8370306"/>
-            <a:chExt cx="8532983" cy="3641152"/>
+            <a:off x="9540044" y="8370306"/>
+            <a:ext cx="8421674" cy="3641152"/>
+            <a:chOff x="9540044" y="8370306"/>
+            <a:chExt cx="8421674" cy="3641152"/>
           </a:xfrm>
         </p:grpSpPr>
         <p:grpSp>
@@ -12031,10 +12031,10 @@
           </p:nvGrpSpPr>
           <p:grpSpPr>
             <a:xfrm>
-              <a:off x="9428735" y="8370306"/>
-              <a:ext cx="8532983" cy="3641152"/>
-              <a:chOff x="9428735" y="8370306"/>
-              <a:chExt cx="8532983" cy="3641152"/>
+              <a:off x="9540044" y="8370306"/>
+              <a:ext cx="8421674" cy="3641152"/>
+              <a:chOff x="9540044" y="8370306"/>
+              <a:chExt cx="8421674" cy="3641152"/>
             </a:xfrm>
           </p:grpSpPr>
           <p:sp>
@@ -12051,8 +12051,8 @@
             </p:nvSpPr>
             <p:spPr>
               <a:xfrm>
-                <a:off x="9428735" y="9946444"/>
-                <a:ext cx="6333068" cy="738664"/>
+                <a:off x="13518345" y="9856633"/>
+                <a:ext cx="1985493" cy="738664"/>
               </a:xfrm>
               <a:prstGeom prst="rect">
                 <a:avLst/>
@@ -12076,7 +12076,7 @@
                     </a:solidFill>
                     <a:latin typeface="Arial Black" panose="020B0A04020102020204" pitchFamily="34" charset="0"/>
                   </a:rPr>
-                  <a:t>Agile with V-Model</a:t>
+                  <a:t>Agile</a:t>
                 </a:r>
                 <a:endParaRPr lang="ko-KR" altLang="en-US" sz="4800" b="1">
                   <a:solidFill>
@@ -15753,6 +15753,59 @@
               </a:p>
             </p:txBody>
           </p:sp>
+          <p:sp>
+            <p:nvSpPr>
+              <p:cNvPr id="146" name="TextBox 145">
+                <a:extLst>
+                  <a:ext uri="{FF2B5EF4-FFF2-40B4-BE49-F238E27FC236}">
+                    <a16:creationId xmlns:a16="http://schemas.microsoft.com/office/drawing/2014/main" id="{FF1574FD-3BAC-4ED5-8A76-05D2EC73D046}"/>
+                  </a:ext>
+                </a:extLst>
+              </p:cNvPr>
+              <p:cNvSpPr txBox="1"/>
+              <p:nvPr/>
+            </p:nvSpPr>
+            <p:spPr>
+              <a:xfrm>
+                <a:off x="10069500" y="9856633"/>
+                <a:ext cx="2772497" cy="738664"/>
+              </a:xfrm>
+              <a:prstGeom prst="rect">
+                <a:avLst/>
+              </a:prstGeom>
+              <a:noFill/>
+            </p:spPr>
+            <p:txBody>
+              <a:bodyPr wrap="square" lIns="0" tIns="0" rIns="0" bIns="0" rtlCol="0">
+                <a:spAutoFit/>
+              </a:bodyPr>
+              <a:lstStyle/>
+              <a:p>
+                <a:pPr algn="ctr"/>
+                <a:r>
+                  <a:rPr lang="en-US" altLang="ko-KR" sz="4800" b="1">
+                    <a:solidFill>
+                      <a:schemeClr val="tx1">
+                        <a:lumMod val="50000"/>
+                        <a:lumOff val="50000"/>
+                      </a:schemeClr>
+                    </a:solidFill>
+                    <a:latin typeface="Arial Black" panose="020B0A04020102020204" pitchFamily="34" charset="0"/>
+                  </a:rPr>
+                  <a:t>V-Model</a:t>
+                </a:r>
+                <a:endParaRPr lang="ko-KR" altLang="en-US" sz="4800" b="1">
+                  <a:solidFill>
+                    <a:schemeClr val="tx1">
+                      <a:lumMod val="50000"/>
+                      <a:lumOff val="50000"/>
+                    </a:schemeClr>
+                  </a:solidFill>
+                  <a:latin typeface="Arial Black" panose="020B0A04020102020204" pitchFamily="34" charset="0"/>
+                </a:endParaRPr>
+              </a:p>
+            </p:txBody>
+          </p:sp>
         </p:grpSp>
         <p:sp>
           <p:nvSpPr>
@@ -15768,7 +15821,7 @@
           </p:nvSpPr>
           <p:spPr>
             <a:xfrm>
-              <a:off x="11681175" y="9207781"/>
+              <a:off x="12787157" y="9856634"/>
               <a:ext cx="786028" cy="738663"/>
             </a:xfrm>
             <a:prstGeom prst="mathPlus">
@@ -15812,10 +15865,10 @@
       </p:grpSp>
       <p:pic>
         <p:nvPicPr>
-          <p:cNvPr id="206" name="그림 205">
+          <p:cNvPr id="2" name="그림 1">
             <a:extLst>
               <a:ext uri="{FF2B5EF4-FFF2-40B4-BE49-F238E27FC236}">
-                <a16:creationId xmlns:a16="http://schemas.microsoft.com/office/drawing/2014/main" id="{A7AD2778-B90D-4653-A1D9-21635B3C1F3A}"/>
+                <a16:creationId xmlns:a16="http://schemas.microsoft.com/office/drawing/2014/main" id="{A797F744-59A4-4E88-8145-771A25F70B70}"/>
               </a:ext>
             </a:extLst>
           </p:cNvPr>
@@ -15832,8 +15885,8 @@
         </p:blipFill>
         <p:spPr>
           <a:xfrm>
-            <a:off x="12338146" y="4392988"/>
-            <a:ext cx="4879000" cy="3788766"/>
+            <a:off x="12383285" y="4376270"/>
+            <a:ext cx="4877144" cy="3777334"/>
           </a:xfrm>
           <a:prstGeom prst="rect">
             <a:avLst/>

</xml_diff>